<commit_message>
further updates ahead of delivery
</commit_message>
<xml_diff>
--- a/Slides/AZ-104T00A-ENU-PowerPoint_00 - done.pptx
+++ b/Slides/AZ-104T00A-ENU-PowerPoint_00 - done.pptx
@@ -238,7 +238,7 @@
               <a:rPr lang="en-US" smtClean="0">
                 <a:latin typeface="Segoe UI" pitchFamily="34" charset="0"/>
               </a:rPr>
-              <a:t>12/5/2022 3:51 PM</a:t>
+              <a:t>12/8/2022 9:01 AM</a:t>
             </a:fld>
             <a:endParaRPr lang="en-US">
               <a:latin typeface="Segoe UI" pitchFamily="34" charset="0"/>
@@ -516,7 +516,7 @@
           <a:p>
             <a:fld id="{DCE60099-03E7-4FA1-8A7F-E6E6CFB0F855}" type="datetime8">
               <a:rPr lang="en-US" smtClean="0"/>
-              <a:t>12/5/2022 3:50 PM</a:t>
+              <a:t>12/8/2022 9:01 AM</a:t>
             </a:fld>
             <a:endParaRPr lang="en-US"/>
           </a:p>
@@ -1047,7 +1047,7 @@
           <a:p>
             <a:fld id="{386CE63F-9E7F-4C04-9D0D-FCA25A8E9E86}" type="datetime8">
               <a:rPr lang="en-US" smtClean="0"/>
-              <a:t>12/5/2022 3:50 PM</a:t>
+              <a:t>12/8/2022 9:01 AM</a:t>
             </a:fld>
             <a:endParaRPr lang="en-US"/>
           </a:p>
@@ -1650,7 +1650,7 @@
           <a:p>
             <a:fld id="{386CE63F-9E7F-4C04-9D0D-FCA25A8E9E86}" type="datetime8">
               <a:rPr lang="en-US" smtClean="0"/>
-              <a:t>12/5/2022 3:50 PM</a:t>
+              <a:t>12/8/2022 9:01 AM</a:t>
             </a:fld>
             <a:endParaRPr lang="en-US"/>
           </a:p>
@@ -2366,7 +2366,7 @@
           <a:p>
             <a:fld id="{386CE63F-9E7F-4C04-9D0D-FCA25A8E9E86}" type="datetime8">
               <a:rPr lang="en-US" smtClean="0"/>
-              <a:t>12/5/2022 3:50 PM</a:t>
+              <a:t>12/8/2022 9:01 AM</a:t>
             </a:fld>
             <a:endParaRPr lang="en-US"/>
           </a:p>
@@ -2700,7 +2700,7 @@
           <a:p>
             <a:fld id="{386CE63F-9E7F-4C04-9D0D-FCA25A8E9E86}" type="datetime8">
               <a:rPr lang="en-US" smtClean="0"/>
-              <a:t>12/5/2022 3:50 PM</a:t>
+              <a:t>12/8/2022 9:01 AM</a:t>
             </a:fld>
             <a:endParaRPr lang="en-US"/>
           </a:p>
@@ -5777,8 +5777,8 @@
         </p:nvSpPr>
         <p:spPr>
           <a:xfrm>
-            <a:off x="451644" y="1140643"/>
-            <a:ext cx="6081132" cy="4999830"/>
+            <a:off x="451643" y="999240"/>
+            <a:ext cx="6081132" cy="5735416"/>
           </a:xfrm>
           <a:prstGeom prst="rect">
             <a:avLst/>
@@ -5800,7 +5800,7 @@
               </a:spcAft>
             </a:pPr>
             <a:r>
-              <a:rPr lang="en-GB" sz="2100" dirty="0">
+              <a:rPr lang="en-GB" sz="2100" b="1" u="sng" dirty="0">
                 <a:gradFill>
                   <a:gsLst>
                     <a:gs pos="2917">
@@ -5952,6 +5952,34 @@
             </a:r>
           </a:p>
           <a:p>
+            <a:pPr marL="342900" indent="-342900">
+              <a:lnSpc>
+                <a:spcPct val="90000"/>
+              </a:lnSpc>
+              <a:spcAft>
+                <a:spcPts val="600"/>
+              </a:spcAft>
+              <a:buFont typeface="Arial" panose="020B0604020202020204" pitchFamily="34" charset="0"/>
+              <a:buChar char="•"/>
+            </a:pPr>
+            <a:r>
+              <a:rPr lang="en-GB" sz="2100" b="1" dirty="0">
+                <a:gradFill>
+                  <a:gsLst>
+                    <a:gs pos="2917">
+                      <a:schemeClr val="tx1"/>
+                    </a:gs>
+                    <a:gs pos="30000">
+                      <a:schemeClr val="tx1"/>
+                    </a:gs>
+                  </a:gsLst>
+                  <a:lin ang="5400000" scaled="0"/>
+                </a:gradFill>
+              </a:rPr>
+              <a:t>Daily Review</a:t>
+            </a:r>
+          </a:p>
+          <a:p>
             <a:pPr>
               <a:lnSpc>
                 <a:spcPct val="90000"/>
@@ -5984,7 +6012,7 @@
               </a:spcAft>
             </a:pPr>
             <a:r>
-              <a:rPr lang="en-GB" sz="2100" dirty="0">
+              <a:rPr lang="en-GB" sz="2100" b="1" u="sng" dirty="0">
                 <a:gradFill>
                   <a:gsLst>
                     <a:gs pos="2917">
@@ -6135,6 +6163,34 @@
               <a:t>Module 8 – Azure Virtual Machines </a:t>
             </a:r>
           </a:p>
+          <a:p>
+            <a:pPr marL="342900" indent="-342900">
+              <a:lnSpc>
+                <a:spcPct val="90000"/>
+              </a:lnSpc>
+              <a:spcAft>
+                <a:spcPts val="600"/>
+              </a:spcAft>
+              <a:buFont typeface="Arial" panose="020B0604020202020204" pitchFamily="34" charset="0"/>
+              <a:buChar char="•"/>
+            </a:pPr>
+            <a:r>
+              <a:rPr lang="en-GB" sz="2100" b="1" dirty="0">
+                <a:gradFill>
+                  <a:gsLst>
+                    <a:gs pos="2917">
+                      <a:schemeClr val="tx1"/>
+                    </a:gs>
+                    <a:gs pos="30000">
+                      <a:schemeClr val="tx1"/>
+                    </a:gs>
+                  </a:gsLst>
+                  <a:lin ang="5400000" scaled="0"/>
+                </a:gradFill>
+              </a:rPr>
+              <a:t>Daily Review</a:t>
+            </a:r>
+          </a:p>
         </p:txBody>
       </p:sp>
       <p:sp>
@@ -6151,8 +6207,8 @@
         </p:nvSpPr>
         <p:spPr>
           <a:xfrm>
-            <a:off x="6383624" y="1140643"/>
-            <a:ext cx="6081132" cy="4999830"/>
+            <a:off x="6383623" y="999240"/>
+            <a:ext cx="6081132" cy="5735416"/>
           </a:xfrm>
           <a:prstGeom prst="rect">
             <a:avLst/>
@@ -6174,7 +6230,7 @@
               </a:spcAft>
             </a:pPr>
             <a:r>
-              <a:rPr lang="en-GB" sz="2100" dirty="0">
+              <a:rPr lang="en-GB" sz="2100" b="1" u="sng" dirty="0">
                 <a:gradFill>
                   <a:gsLst>
                     <a:gs pos="2917">
@@ -6298,6 +6354,34 @@
             </a:r>
           </a:p>
           <a:p>
+            <a:pPr marL="342900" indent="-342900">
+              <a:lnSpc>
+                <a:spcPct val="90000"/>
+              </a:lnSpc>
+              <a:spcAft>
+                <a:spcPts val="600"/>
+              </a:spcAft>
+              <a:buFont typeface="Arial" panose="020B0604020202020204" pitchFamily="34" charset="0"/>
+              <a:buChar char="•"/>
+            </a:pPr>
+            <a:r>
+              <a:rPr lang="en-GB" sz="2100" b="1" dirty="0">
+                <a:gradFill>
+                  <a:gsLst>
+                    <a:gs pos="2917">
+                      <a:schemeClr val="tx1"/>
+                    </a:gs>
+                    <a:gs pos="30000">
+                      <a:schemeClr val="tx1"/>
+                    </a:gs>
+                  </a:gsLst>
+                  <a:lin ang="5400000" scaled="0"/>
+                </a:gradFill>
+              </a:rPr>
+              <a:t>Daily Review</a:t>
+            </a:r>
+          </a:p>
+          <a:p>
             <a:pPr>
               <a:lnSpc>
                 <a:spcPct val="90000"/>
@@ -6329,8 +6413,31 @@
                 <a:spcPts val="600"/>
               </a:spcAft>
             </a:pPr>
-            <a:r>
-              <a:rPr lang="en-GB" sz="2100" dirty="0">
+            <a:endParaRPr lang="en-GB" sz="2100" dirty="0">
+              <a:gradFill>
+                <a:gsLst>
+                  <a:gs pos="2917">
+                    <a:schemeClr val="tx1"/>
+                  </a:gs>
+                  <a:gs pos="30000">
+                    <a:schemeClr val="tx1"/>
+                  </a:gs>
+                </a:gsLst>
+                <a:lin ang="5400000" scaled="0"/>
+              </a:gradFill>
+            </a:endParaRPr>
+          </a:p>
+          <a:p>
+            <a:pPr>
+              <a:lnSpc>
+                <a:spcPct val="90000"/>
+              </a:lnSpc>
+              <a:spcAft>
+                <a:spcPts val="600"/>
+              </a:spcAft>
+            </a:pPr>
+            <a:r>
+              <a:rPr lang="en-GB" sz="2100" b="1" u="sng" dirty="0">
                 <a:gradFill>
                   <a:gsLst>
                     <a:gs pos="2917">
@@ -6478,7 +6585,7 @@
                   <a:lin ang="5400000" scaled="0"/>
                 </a:gradFill>
               </a:rPr>
-              <a:t>Exam Cram Study</a:t>
+              <a:t>Exam Cram Study PDF</a:t>
             </a:r>
           </a:p>
           <a:p>
@@ -6506,7 +6613,7 @@
                   <a:lin ang="5400000" scaled="0"/>
                 </a:gradFill>
               </a:rPr>
-              <a:t>Pass AZ-104</a:t>
+              <a:t>Ace Pass AZ-104</a:t>
             </a:r>
           </a:p>
         </p:txBody>
@@ -6587,7 +6694,7 @@
         <p:spPr>
           <a:xfrm>
             <a:off x="451643" y="1253765"/>
-            <a:ext cx="11633520" cy="4976747"/>
+            <a:ext cx="11633520" cy="5629233"/>
           </a:xfrm>
           <a:prstGeom prst="rect">
             <a:avLst/>
@@ -6705,6 +6812,34 @@
             </a:r>
           </a:p>
           <a:p>
+            <a:pPr marL="809271" lvl="1" indent="-342900">
+              <a:lnSpc>
+                <a:spcPct val="90000"/>
+              </a:lnSpc>
+              <a:spcAft>
+                <a:spcPts val="600"/>
+              </a:spcAft>
+              <a:buFont typeface="Arial" panose="020B0604020202020204" pitchFamily="34" charset="0"/>
+              <a:buChar char="•"/>
+            </a:pPr>
+            <a:r>
+              <a:rPr lang="en-GB" sz="1200" dirty="0">
+                <a:gradFill>
+                  <a:gsLst>
+                    <a:gs pos="2917">
+                      <a:schemeClr val="tx1"/>
+                    </a:gs>
+                    <a:gs pos="30000">
+                      <a:schemeClr val="tx1"/>
+                    </a:gs>
+                  </a:gsLst>
+                  <a:lin ang="5400000" scaled="0"/>
+                </a:gradFill>
+              </a:rPr>
+              <a:t>15m break</a:t>
+            </a:r>
+          </a:p>
+          <a:p>
             <a:pPr marL="342900" indent="-342900">
               <a:lnSpc>
                 <a:spcPct val="90000"/>
@@ -6786,6 +6921,34 @@
                 </a:gradFill>
               </a:rPr>
               <a:t>Hands on Labs</a:t>
+            </a:r>
+          </a:p>
+          <a:p>
+            <a:pPr marL="809271" lvl="1" indent="-342900">
+              <a:lnSpc>
+                <a:spcPct val="90000"/>
+              </a:lnSpc>
+              <a:spcAft>
+                <a:spcPts val="600"/>
+              </a:spcAft>
+              <a:buFont typeface="Arial" panose="020B0604020202020204" pitchFamily="34" charset="0"/>
+              <a:buChar char="•"/>
+            </a:pPr>
+            <a:r>
+              <a:rPr lang="en-GB" sz="1200" dirty="0">
+                <a:gradFill>
+                  <a:gsLst>
+                    <a:gs pos="2917">
+                      <a:schemeClr val="tx1"/>
+                    </a:gs>
+                    <a:gs pos="30000">
+                      <a:schemeClr val="tx1"/>
+                    </a:gs>
+                  </a:gsLst>
+                  <a:lin ang="5400000" scaled="0"/>
+                </a:gradFill>
+              </a:rPr>
+              <a:t>15m break</a:t>
             </a:r>
           </a:p>
           <a:p>

</xml_diff>

<commit_message>
Update AZ-104T00A-ENU-PowerPoint_00 - done.pptx
</commit_message>
<xml_diff>
--- a/Slides/AZ-104T00A-ENU-PowerPoint_00 - done.pptx
+++ b/Slides/AZ-104T00A-ENU-PowerPoint_00 - done.pptx
@@ -239,7 +239,7 @@
               <a:rPr lang="en-US" smtClean="0">
                 <a:latin typeface="Segoe UI" pitchFamily="34" charset="0"/>
               </a:rPr>
-              <a:t>12/11/2022 4:58 PM</a:t>
+              <a:t>12/11/2022 5:02 PM</a:t>
             </a:fld>
             <a:endParaRPr lang="en-US">
               <a:latin typeface="Segoe UI" pitchFamily="34" charset="0"/>
@@ -517,7 +517,7 @@
           <a:p>
             <a:fld id="{DCE60099-03E7-4FA1-8A7F-E6E6CFB0F855}" type="datetime8">
               <a:rPr lang="en-US" smtClean="0"/>
-              <a:t>12/11/2022 4:58 PM</a:t>
+              <a:t>12/11/2022 5:02 PM</a:t>
             </a:fld>
             <a:endParaRPr lang="en-US"/>
           </a:p>
@@ -1048,7 +1048,7 @@
           <a:p>
             <a:fld id="{386CE63F-9E7F-4C04-9D0D-FCA25A8E9E86}" type="datetime8">
               <a:rPr lang="en-US" smtClean="0"/>
-              <a:t>12/11/2022 4:58 PM</a:t>
+              <a:t>12/11/2022 5:02 PM</a:t>
             </a:fld>
             <a:endParaRPr lang="en-US"/>
           </a:p>
@@ -1651,7 +1651,7 @@
           <a:p>
             <a:fld id="{386CE63F-9E7F-4C04-9D0D-FCA25A8E9E86}" type="datetime8">
               <a:rPr lang="en-US" smtClean="0"/>
-              <a:t>12/11/2022 4:58 PM</a:t>
+              <a:t>12/11/2022 5:02 PM</a:t>
             </a:fld>
             <a:endParaRPr lang="en-US"/>
           </a:p>
@@ -2367,7 +2367,7 @@
           <a:p>
             <a:fld id="{386CE63F-9E7F-4C04-9D0D-FCA25A8E9E86}" type="datetime8">
               <a:rPr lang="en-US" smtClean="0"/>
-              <a:t>12/11/2022 4:58 PM</a:t>
+              <a:t>12/11/2022 5:02 PM</a:t>
             </a:fld>
             <a:endParaRPr lang="en-US"/>
           </a:p>
@@ -2701,7 +2701,7 @@
           <a:p>
             <a:fld id="{386CE63F-9E7F-4C04-9D0D-FCA25A8E9E86}" type="datetime8">
               <a:rPr lang="en-US" smtClean="0"/>
-              <a:t>12/11/2022 4:58 PM</a:t>
+              <a:t>12/11/2022 5:02 PM</a:t>
             </a:fld>
             <a:endParaRPr lang="en-US"/>
           </a:p>
@@ -8377,8 +8377,8 @@
         </p:nvSpPr>
         <p:spPr>
           <a:xfrm>
-            <a:off x="451642" y="1106805"/>
-            <a:ext cx="11426131" cy="2031325"/>
+            <a:off x="451643" y="1250493"/>
+            <a:ext cx="11784350" cy="4493538"/>
           </a:xfrm>
           <a:prstGeom prst="rect">
             <a:avLst/>
@@ -8392,62 +8392,99 @@
           <a:lstStyle/>
           <a:p>
             <a:r>
-              <a:rPr lang="en-GB" dirty="0"/>
+              <a:rPr lang="en-GB" sz="2200" dirty="0"/>
               <a:t>GitHub repo for the course </a:t>
             </a:r>
             <a:r>
-              <a:rPr lang="en-GB" dirty="0">
+              <a:rPr lang="en-GB" sz="2200" dirty="0">
                 <a:hlinkClick r:id="rId2"/>
               </a:rPr>
               <a:t>https://github.com/ryanpbetts/az-104-material</a:t>
             </a:r>
-            <a:endParaRPr lang="en-GB" dirty="0"/>
-          </a:p>
-          <a:p>
-            <a:endParaRPr lang="en-GB" dirty="0"/>
-          </a:p>
-          <a:p>
-            <a:r>
-              <a:rPr lang="en-GB" dirty="0"/>
+            <a:endParaRPr lang="en-GB" sz="2200" dirty="0"/>
+          </a:p>
+          <a:p>
+            <a:endParaRPr lang="en-GB" sz="2200" dirty="0"/>
+          </a:p>
+          <a:p>
+            <a:r>
+              <a:rPr lang="en-GB" sz="2200" dirty="0"/>
               <a:t>MOC AZ-104 lab guide </a:t>
             </a:r>
             <a:r>
-              <a:rPr lang="en-GB" dirty="0">
+              <a:rPr lang="en-GB" sz="2200" dirty="0">
                 <a:hlinkClick r:id="rId3"/>
               </a:rPr>
               <a:t>https://microsoftlearning.github.io/AZ-104-MicrosoftAzureAdministrator/</a:t>
             </a:r>
-            <a:endParaRPr lang="en-GB" dirty="0"/>
-          </a:p>
-          <a:p>
-            <a:endParaRPr lang="en-GB" dirty="0"/>
-          </a:p>
-          <a:p>
-            <a:r>
-              <a:rPr lang="en-GB" dirty="0"/>
+            <a:endParaRPr lang="en-GB" sz="2200" dirty="0"/>
+          </a:p>
+          <a:p>
+            <a:endParaRPr lang="en-GB" sz="2200" dirty="0"/>
+          </a:p>
+          <a:p>
+            <a:r>
+              <a:rPr lang="en-GB" sz="2200" dirty="0"/>
               <a:t>MS Learn path for AZ-104 </a:t>
             </a:r>
             <a:r>
-              <a:rPr lang="en-GB" dirty="0">
+              <a:rPr lang="en-GB" sz="2200" dirty="0">
                 <a:hlinkClick r:id="rId4"/>
               </a:rPr>
               <a:t>https://learn.microsoft.com/en-us/certifications/exams/az-104</a:t>
             </a:r>
-            <a:endParaRPr lang="en-GB" dirty="0"/>
-          </a:p>
-          <a:p>
-            <a:endParaRPr lang="en-GB" dirty="0"/>
-          </a:p>
-          <a:p>
-            <a:r>
-              <a:rPr lang="en-GB" dirty="0"/>
-              <a:t>MS AZ-104 </a:t>
-            </a:r>
-            <a:r>
-              <a:rPr lang="en-GB"/>
-              <a:t>Exam Blueprint </a:t>
-            </a:r>
-            <a:endParaRPr lang="en-GB" dirty="0"/>
+            <a:endParaRPr lang="en-GB" sz="2200" dirty="0"/>
+          </a:p>
+          <a:p>
+            <a:endParaRPr lang="en-GB" sz="2200" dirty="0"/>
+          </a:p>
+          <a:p>
+            <a:r>
+              <a:rPr lang="en-GB" sz="2200" dirty="0"/>
+              <a:t>MS AZ-104 Exam Blueprint </a:t>
+            </a:r>
+            <a:r>
+              <a:rPr lang="en-GB" sz="2200" dirty="0">
+                <a:hlinkClick r:id="rId5"/>
+              </a:rPr>
+              <a:t>https://github.com/ryanpbetts/az-104-material/blob/main/PDFs/AZ-104_Blueprint.pdf</a:t>
+            </a:r>
+            <a:endParaRPr lang="en-GB" sz="2200" dirty="0"/>
+          </a:p>
+          <a:p>
+            <a:endParaRPr lang="en-GB" sz="2200" dirty="0"/>
+          </a:p>
+          <a:p>
+            <a:r>
+              <a:rPr lang="en-GB" sz="2200" dirty="0"/>
+              <a:t>Microsoft MCP link </a:t>
+            </a:r>
+            <a:r>
+              <a:rPr lang="en-GB" sz="2200" dirty="0">
+                <a:hlinkClick r:id="rId6"/>
+              </a:rPr>
+              <a:t>https://microsoft.com/mcp</a:t>
+            </a:r>
+            <a:r>
+              <a:rPr lang="en-GB" sz="2200" dirty="0"/>
+              <a:t>  </a:t>
+            </a:r>
+          </a:p>
+          <a:p>
+            <a:endParaRPr lang="en-GB" sz="2200" dirty="0"/>
+          </a:p>
+          <a:p>
+            <a:r>
+              <a:rPr lang="en-GB" sz="2200" dirty="0"/>
+              <a:t>Measure Up practice tests </a:t>
+            </a:r>
+            <a:r>
+              <a:rPr lang="en-GB" sz="2200" dirty="0">
+                <a:hlinkClick r:id="rId7"/>
+              </a:rPr>
+              <a:t>https://www.measureup.com/</a:t>
+            </a:r>
+            <a:endParaRPr lang="en-GB" sz="2200" dirty="0"/>
           </a:p>
         </p:txBody>
       </p:sp>

</xml_diff>